<commit_message>
added first draft of playbook
</commit_message>
<xml_diff>
--- a/resources/LangDev 2025 Talk.pptx
+++ b/resources/LangDev 2025 Talk.pptx
@@ -19250,9 +19250,7 @@
             <a:avLst/>
           </a:prstGeom>
           <a:solidFill>
-            <a:schemeClr val="accent1">
-              <a:lumMod val="50000"/>
-            </a:schemeClr>
+            <a:schemeClr val="accent4"/>
           </a:solidFill>
           <a:ln>
             <a:noFill/>
@@ -19281,17 +19279,26 @@
             <a:pPr algn="ctr"/>
             <a:r>
               <a:rPr lang="en-US" sz="2400" b="1" dirty="0" err="1">
+                <a:solidFill>
+                  <a:schemeClr val="tx1"/>
+                </a:solidFill>
                 <a:latin typeface="Gilmer Bold" pitchFamily="2" charset="77"/>
               </a:rPr>
               <a:t>WebClient</a:t>
             </a:r>
             <a:r>
               <a:rPr lang="en-US" sz="2400" b="1" dirty="0">
+                <a:solidFill>
+                  <a:schemeClr val="tx1"/>
+                </a:solidFill>
                 <a:latin typeface="Gilmer Bold" pitchFamily="2" charset="77"/>
               </a:rPr>
               <a:t> B</a:t>
             </a:r>
             <a:endParaRPr lang="en-NL" sz="2400" b="1" dirty="0">
+              <a:solidFill>
+                <a:schemeClr val="tx1"/>
+              </a:solidFill>
               <a:latin typeface="Gilmer Bold" pitchFamily="2" charset="77"/>
             </a:endParaRPr>
           </a:p>
@@ -19383,9 +19390,7 @@
             <a:avLst/>
           </a:prstGeom>
           <a:solidFill>
-            <a:schemeClr val="accent1">
-              <a:lumMod val="50000"/>
-            </a:schemeClr>
+            <a:schemeClr val="accent4"/>
           </a:solidFill>
           <a:ln>
             <a:noFill/>
@@ -19414,17 +19419,26 @@
             <a:pPr algn="ctr"/>
             <a:r>
               <a:rPr lang="en-US" sz="2400" b="1" dirty="0" err="1">
+                <a:solidFill>
+                  <a:schemeClr val="tx1"/>
+                </a:solidFill>
                 <a:latin typeface="Gilmer Bold" pitchFamily="2" charset="77"/>
               </a:rPr>
               <a:t>WebClient</a:t>
             </a:r>
             <a:r>
               <a:rPr lang="en-US" sz="2400" b="1" dirty="0">
+                <a:solidFill>
+                  <a:schemeClr val="tx1"/>
+                </a:solidFill>
                 <a:latin typeface="Gilmer Bold" pitchFamily="2" charset="77"/>
               </a:rPr>
               <a:t> A</a:t>
             </a:r>
             <a:endParaRPr lang="en-NL" sz="2400" b="1" dirty="0">
+              <a:solidFill>
+                <a:schemeClr val="tx1"/>
+              </a:solidFill>
               <a:latin typeface="Gilmer Bold" pitchFamily="2" charset="77"/>
             </a:endParaRPr>
           </a:p>
@@ -19516,9 +19530,7 @@
             <a:avLst/>
           </a:prstGeom>
           <a:solidFill>
-            <a:schemeClr val="accent1">
-              <a:lumMod val="50000"/>
-            </a:schemeClr>
+            <a:srgbClr val="C8CCFF"/>
           </a:solidFill>
           <a:ln>
             <a:noFill/>
@@ -19546,12 +19558,18 @@
           <a:p>
             <a:pPr algn="ctr"/>
             <a:r>
-              <a:rPr lang="en-US" sz="2400" b="1" dirty="0" err="1">
+              <a:rPr lang="en-US" sz="2400" b="1" dirty="0">
+                <a:solidFill>
+                  <a:schemeClr val="tx1"/>
+                </a:solidFill>
                 <a:latin typeface="Gilmer Bold" pitchFamily="2" charset="77"/>
               </a:rPr>
-              <a:t>FileWatcher</a:t>
+              <a:t>Loader</a:t>
             </a:r>
             <a:endParaRPr lang="en-NL" sz="2400" b="1" dirty="0">
+              <a:solidFill>
+                <a:schemeClr val="tx1"/>
+              </a:solidFill>
               <a:latin typeface="Gilmer Bold" pitchFamily="2" charset="77"/>
             </a:endParaRPr>
           </a:p>
@@ -19676,9 +19694,7 @@
             <a:avLst/>
           </a:prstGeom>
           <a:solidFill>
-            <a:schemeClr val="accent1">
-              <a:lumMod val="50000"/>
-            </a:schemeClr>
+            <a:srgbClr val="FFA9A9"/>
           </a:solidFill>
           <a:ln>
             <a:noFill/>
@@ -19707,11 +19723,17 @@
             <a:pPr algn="ctr"/>
             <a:r>
               <a:rPr lang="en-US" sz="2400" b="1" dirty="0">
+                <a:solidFill>
+                  <a:schemeClr val="tx1"/>
+                </a:solidFill>
                 <a:latin typeface="Gilmer Bold" pitchFamily="2" charset="77"/>
               </a:rPr>
               <a:t>Repository</a:t>
             </a:r>
             <a:endParaRPr lang="en-NL" sz="2400" b="1" dirty="0">
+              <a:solidFill>
+                <a:schemeClr val="tx1"/>
+              </a:solidFill>
               <a:latin typeface="Gilmer Bold" pitchFamily="2" charset="77"/>
             </a:endParaRPr>
           </a:p>
@@ -19882,9 +19904,7 @@
             <a:avLst/>
           </a:prstGeom>
           <a:solidFill>
-            <a:schemeClr val="accent1">
-              <a:lumMod val="50000"/>
-            </a:schemeClr>
+            <a:srgbClr val="B3FFC8"/>
           </a:solidFill>
           <a:ln>
             <a:noFill/>
@@ -19913,11 +19933,17 @@
             <a:pPr algn="ctr"/>
             <a:r>
               <a:rPr lang="en-US" sz="2400" b="1" dirty="0">
+                <a:solidFill>
+                  <a:schemeClr val="tx1"/>
+                </a:solidFill>
                 <a:latin typeface="Gilmer Bold" pitchFamily="2" charset="77"/>
               </a:rPr>
               <a:t>Validator</a:t>
             </a:r>
             <a:endParaRPr lang="en-NL" sz="2400" b="1" dirty="0">
+              <a:solidFill>
+                <a:schemeClr val="tx1"/>
+              </a:solidFill>
               <a:latin typeface="Gilmer Bold" pitchFamily="2" charset="77"/>
             </a:endParaRPr>
           </a:p>

</xml_diff>

<commit_message>
updated slack link + qr code
</commit_message>
<xml_diff>
--- a/resources/LangDev 2025 Talk.pptx
+++ b/resources/LangDev 2025 Talk.pptx
@@ -217,7 +217,7 @@
           <a:p>
             <a:fld id="{A83D55DB-2215-1E4A-893A-2A5EF07198DE}" type="datetimeFigureOut">
               <a:rPr lang="en-NL" smtClean="0"/>
-              <a:t>15/10/2025</a:t>
+              <a:t>10/31/2025</a:t>
             </a:fld>
             <a:endParaRPr lang="en-NL"/>
           </a:p>
@@ -719,7 +719,7 @@
           <a:p>
             <a:fld id="{4B15492D-6F0F-2E4F-9FB6-8AD2245E2E8C}" type="datetimeFigureOut">
               <a:rPr lang="en-NL" smtClean="0"/>
-              <a:t>15/10/2025</a:t>
+              <a:t>10/31/2025</a:t>
             </a:fld>
             <a:endParaRPr lang="en-NL"/>
           </a:p>
@@ -1013,7 +1013,7 @@
           <a:p>
             <a:fld id="{4B15492D-6F0F-2E4F-9FB6-8AD2245E2E8C}" type="datetimeFigureOut">
               <a:rPr lang="en-NL" smtClean="0"/>
-              <a:t>15/10/2025</a:t>
+              <a:t>10/31/2025</a:t>
             </a:fld>
             <a:endParaRPr lang="en-NL"/>
           </a:p>
@@ -2303,7 +2303,7 @@
           <a:p>
             <a:fld id="{4B15492D-6F0F-2E4F-9FB6-8AD2245E2E8C}" type="datetimeFigureOut">
               <a:rPr lang="en-NL" smtClean="0"/>
-              <a:t>15/10/2025</a:t>
+              <a:t>10/31/2025</a:t>
             </a:fld>
             <a:endParaRPr lang="en-NL"/>
           </a:p>
@@ -2641,7 +2641,7 @@
           <a:p>
             <a:fld id="{4B15492D-6F0F-2E4F-9FB6-8AD2245E2E8C}" type="datetimeFigureOut">
               <a:rPr lang="en-NL" smtClean="0"/>
-              <a:t>15/10/2025</a:t>
+              <a:t>10/31/2025</a:t>
             </a:fld>
             <a:endParaRPr lang="en-NL"/>
           </a:p>
@@ -2955,7 +2955,7 @@
           <a:p>
             <a:fld id="{4B15492D-6F0F-2E4F-9FB6-8AD2245E2E8C}" type="datetimeFigureOut">
               <a:rPr lang="en-NL" smtClean="0"/>
-              <a:t>15/10/2025</a:t>
+              <a:t>10/31/2025</a:t>
             </a:fld>
             <a:endParaRPr lang="en-NL"/>
           </a:p>
@@ -3133,7 +3133,7 @@
           <a:p>
             <a:fld id="{4B15492D-6F0F-2E4F-9FB6-8AD2245E2E8C}" type="datetimeFigureOut">
               <a:rPr lang="en-NL" smtClean="0"/>
-              <a:t>15/10/2025</a:t>
+              <a:t>10/31/2025</a:t>
             </a:fld>
             <a:endParaRPr lang="en-NL"/>
           </a:p>
@@ -3282,7 +3282,7 @@
           <a:p>
             <a:fld id="{4B15492D-6F0F-2E4F-9FB6-8AD2245E2E8C}" type="datetimeFigureOut">
               <a:rPr lang="en-NL" smtClean="0"/>
-              <a:t>15/10/2025</a:t>
+              <a:t>10/31/2025</a:t>
             </a:fld>
             <a:endParaRPr lang="en-NL"/>
           </a:p>
@@ -3595,7 +3595,7 @@
           <a:p>
             <a:fld id="{4B15492D-6F0F-2E4F-9FB6-8AD2245E2E8C}" type="datetimeFigureOut">
               <a:rPr lang="en-NL" smtClean="0"/>
-              <a:t>15/10/2025</a:t>
+              <a:t>10/31/2025</a:t>
             </a:fld>
             <a:endParaRPr lang="en-NL"/>
           </a:p>
@@ -3888,7 +3888,7 @@
           <a:p>
             <a:fld id="{4B15492D-6F0F-2E4F-9FB6-8AD2245E2E8C}" type="datetimeFigureOut">
               <a:rPr lang="en-NL" smtClean="0"/>
-              <a:t>15/10/2025</a:t>
+              <a:t>10/31/2025</a:t>
             </a:fld>
             <a:endParaRPr lang="en-NL"/>
           </a:p>
@@ -4088,7 +4088,7 @@
           <a:p>
             <a:fld id="{4B15492D-6F0F-2E4F-9FB6-8AD2245E2E8C}" type="datetimeFigureOut">
               <a:rPr lang="en-NL" smtClean="0"/>
-              <a:t>15/10/2025</a:t>
+              <a:t>10/31/2025</a:t>
             </a:fld>
             <a:endParaRPr lang="en-NL"/>
           </a:p>
@@ -4373,7 +4373,7 @@
             <a:fld id="{4B15492D-6F0F-2E4F-9FB6-8AD2245E2E8C}" type="datetimeFigureOut">
               <a:rPr lang="en-NL" smtClean="0"/>
               <a:pPr/>
-              <a:t>15/10/2025</a:t>
+              <a:t>10/31/2025</a:t>
             </a:fld>
             <a:endParaRPr lang="en-NL" dirty="0"/>
           </a:p>
@@ -21091,32 +21091,21 @@
               </a:rPr>
               <a:t>:</a:t>
             </a:r>
-            <a:endParaRPr lang="en-US" sz="1600" b="0" u="none" strike="noStrike" dirty="0">
+            <a:endParaRPr lang="en-US" sz="1600" b="1" u="none" strike="noStrike" dirty="0">
               <a:solidFill>
-                <a:srgbClr val="FFFFFF"/>
+                <a:schemeClr val="dk1"/>
               </a:solidFill>
               <a:effectLst/>
               <a:uFillTx/>
-              <a:latin typeface="Calibri"/>
+              <a:latin typeface="Gill Sans MT"/>
             </a:endParaRPr>
           </a:p>
           <a:p>
-            <a:pPr defTabSz="914400">
-              <a:lnSpc>
-                <a:spcPct val="100000"/>
-              </a:lnSpc>
-              <a:spcBef>
-                <a:spcPts val="201"/>
-              </a:spcBef>
-            </a:pPr>
             <a:r>
-              <a:rPr lang="en-GB" sz="1600" b="0" u="sng" strike="noStrike" dirty="0">
+              <a:rPr lang="en-US" sz="1600" dirty="0">
                 <a:solidFill>
-                  <a:schemeClr val="dk1"/>
+                  <a:srgbClr val="FFFFFF"/>
                 </a:solidFill>
-                <a:effectLst/>
-                <a:uFillTx/>
-                <a:latin typeface="Gill Sans MT"/>
                 <a:hlinkClick r:id="rId5"/>
               </a:rPr>
               <a:t>https://join.slack.com/t/lionweb/shared_invite/zt-2k1k5bsv7-EvC2IABIgSxWrqJNVOZ0HQ</a:t>
@@ -21567,6 +21556,7 @@
         </p:nvPicPr>
         <p:blipFill>
           <a:blip r:embed="rId6"/>
+          <a:srcRect/>
           <a:stretch/>
         </p:blipFill>
         <p:spPr>

</xml_diff>